<commit_message>
Repo cleaning, new sws file, updates for presentation and user guide
</commit_message>
<xml_diff>
--- a/docs/NumbexFinalPresentation.pptx
+++ b/docs/NumbexFinalPresentation.pptx
@@ -9657,7 +9657,42 @@
                 <a:latin typeface="Courier New" pitchFamily="49" charset="0"/>
                 <a:cs typeface="Courier New" pitchFamily="49" charset="0"/>
               </a:rPr>
-              <a:t>	git://89.79.137.175:21111/</a:t>
+              <a:t>	</a:t>
+            </a:r>
+            <a:r>
+              <a:rPr lang="en-US" dirty="0" err="1" smtClean="0">
+                <a:latin typeface="Courier New" pitchFamily="49" charset="0"/>
+                <a:cs typeface="Courier New" pitchFamily="49" charset="0"/>
+              </a:rPr>
+              <a:t>git</a:t>
+            </a:r>
+            <a:r>
+              <a:rPr lang="en-US" dirty="0" smtClean="0">
+                <a:latin typeface="Courier New" pitchFamily="49" charset="0"/>
+                <a:cs typeface="Courier New" pitchFamily="49" charset="0"/>
+              </a:rPr>
+              <a:t>://</a:t>
+            </a:r>
+            <a:r>
+              <a:rPr lang="pl-PL" dirty="0" err="1" smtClean="0">
+                <a:latin typeface="Courier New" pitchFamily="49" charset="0"/>
+                <a:cs typeface="Courier New" pitchFamily="49" charset="0"/>
+              </a:rPr>
+              <a:t>localhost</a:t>
+            </a:r>
+            <a:r>
+              <a:rPr lang="en-US" dirty="0" smtClean="0">
+                <a:latin typeface="Courier New" pitchFamily="49" charset="0"/>
+                <a:cs typeface="Courier New" pitchFamily="49" charset="0"/>
+              </a:rPr>
+              <a:t>:21111</a:t>
+            </a:r>
+            <a:r>
+              <a:rPr lang="en-US" dirty="0" smtClean="0">
+                <a:latin typeface="Courier New" pitchFamily="49" charset="0"/>
+                <a:cs typeface="Courier New" pitchFamily="49" charset="0"/>
+              </a:rPr>
+              <a:t>/</a:t>
             </a:r>
           </a:p>
           <a:p>

</xml_diff>

<commit_message>
drobne poprawki w prezentacji
</commit_message>
<xml_diff>
--- a/docs/NumbexFinalPresentation.pptx
+++ b/docs/NumbexFinalPresentation.pptx
@@ -53,6 +53,7 @@
     <p:sldId id="301" r:id="rId47"/>
     <p:sldId id="302" r:id="rId48"/>
     <p:sldId id="303" r:id="rId49"/>
+    <p:sldId id="305" r:id="rId50"/>
   </p:sldIdLst>
   <p:sldSz cx="9144000" cy="6858000" type="screen4x3"/>
   <p:notesSz cx="6858000" cy="9144000"/>
@@ -8105,7 +8106,15 @@
             </a:r>
             <a:r>
               <a:rPr lang="pl-PL" sz="1400" dirty="0" smtClean="0"/>
-              <a:t> = git://imbaczek.no-ip.info:20333/</a:t>
+              <a:t> = git</a:t>
+            </a:r>
+            <a:r>
+              <a:rPr lang="pl-PL" sz="1400" dirty="0" smtClean="0"/>
+              <a:t>://localhost:20333</a:t>
+            </a:r>
+            <a:r>
+              <a:rPr lang="pl-PL" sz="1400" dirty="0" smtClean="0"/>
+              <a:t>/</a:t>
             </a:r>
           </a:p>
           <a:p>
@@ -9685,14 +9694,7 @@
                 <a:latin typeface="Courier New" pitchFamily="49" charset="0"/>
                 <a:cs typeface="Courier New" pitchFamily="49" charset="0"/>
               </a:rPr>
-              <a:t>:21111</a:t>
-            </a:r>
-            <a:r>
-              <a:rPr lang="en-US" dirty="0" smtClean="0">
-                <a:latin typeface="Courier New" pitchFamily="49" charset="0"/>
-                <a:cs typeface="Courier New" pitchFamily="49" charset="0"/>
-              </a:rPr>
-              <a:t>/</a:t>
+              <a:t>:21111/</a:t>
             </a:r>
           </a:p>
           <a:p>
@@ -11083,14 +11085,46 @@
           <a:p>
             <a:r>
               <a:rPr lang="pl-PL" dirty="0" smtClean="0"/>
-              <a:t>Po dokonaniu importu demon przestaje dokonywać importu z p2p.</a:t>
-            </a:r>
-          </a:p>
-          <a:p>
-            <a:r>
-              <a:rPr lang="pl-PL" dirty="0" smtClean="0"/>
-              <a:t>Należy użyć p2p-export po upewnieniu się, że dane są poprawne.</a:t>
-            </a:r>
+              <a:t>Po dokonaniu </a:t>
+            </a:r>
+            <a:r>
+              <a:rPr lang="pl-PL" dirty="0" smtClean="0"/>
+              <a:t>importu </a:t>
+            </a:r>
+            <a:r>
+              <a:rPr lang="pl-PL" dirty="0" err="1" smtClean="0"/>
+              <a:t>csv</a:t>
+            </a:r>
+            <a:r>
+              <a:rPr lang="pl-PL" dirty="0" smtClean="0"/>
+              <a:t> </a:t>
+            </a:r>
+            <a:r>
+              <a:rPr lang="pl-PL" dirty="0" smtClean="0"/>
+              <a:t>demon przestaje dokonywać importu z </a:t>
+            </a:r>
+            <a:r>
+              <a:rPr lang="pl-PL" dirty="0" smtClean="0"/>
+              <a:t>p2p – zapobieżenie utracie danych.</a:t>
+            </a:r>
+            <a:endParaRPr lang="pl-PL" dirty="0" smtClean="0"/>
+          </a:p>
+          <a:p>
+            <a:r>
+              <a:rPr lang="pl-PL" dirty="0" smtClean="0"/>
+              <a:t>Należy użyć p2p-export po upewnieniu się, że dane są poprawne</a:t>
+            </a:r>
+            <a:r>
+              <a:rPr lang="pl-PL" dirty="0" smtClean="0"/>
+              <a:t>.</a:t>
+            </a:r>
+          </a:p>
+          <a:p>
+            <a:r>
+              <a:rPr lang="pl-PL" dirty="0" smtClean="0"/>
+              <a:t>Następny p2p-import uzupełni bazę do aktualnego stanu.</a:t>
+            </a:r>
+            <a:endParaRPr lang="pl-PL" dirty="0" smtClean="0"/>
           </a:p>
         </p:txBody>
       </p:sp>
@@ -14190,6 +14224,90 @@
 </p:sld>
 </file>
 
+<file path=ppt/slides/slide49.xml><?xml version="1.0" encoding="utf-8"?>
+<p:sld xmlns:a="http://schemas.openxmlformats.org/drawingml/2006/main" xmlns:r="http://schemas.openxmlformats.org/officeDocument/2006/relationships" xmlns:p="http://schemas.openxmlformats.org/presentationml/2006/main">
+  <p:cSld>
+    <p:spTree>
+      <p:nvGrpSpPr>
+        <p:cNvPr id="1" name=""/>
+        <p:cNvGrpSpPr/>
+        <p:nvPr/>
+      </p:nvGrpSpPr>
+      <p:grpSpPr>
+        <a:xfrm>
+          <a:off x="0" y="0"/>
+          <a:ext cx="0" cy="0"/>
+          <a:chOff x="0" y="0"/>
+          <a:chExt cx="0" cy="0"/>
+        </a:xfrm>
+      </p:grpSpPr>
+      <p:sp>
+        <p:nvSpPr>
+          <p:cNvPr id="2" name="Symbol zastępczy zawartości 1"/>
+          <p:cNvSpPr>
+            <a:spLocks noGrp="1"/>
+          </p:cNvSpPr>
+          <p:nvPr>
+            <p:ph idx="1"/>
+          </p:nvPr>
+        </p:nvSpPr>
+        <p:spPr/>
+        <p:txBody>
+          <a:bodyPr/>
+          <a:lstStyle/>
+          <a:p>
+            <a:r>
+              <a:rPr lang="pl-PL" dirty="0" smtClean="0"/>
+              <a:t>37 przypadków testowych</a:t>
+            </a:r>
+          </a:p>
+          <a:p>
+            <a:pPr lvl="1"/>
+            <a:r>
+              <a:rPr lang="pl-PL" dirty="0" smtClean="0"/>
+              <a:t>904 LOC</a:t>
+            </a:r>
+          </a:p>
+          <a:p>
+            <a:r>
+              <a:rPr lang="pl-PL" dirty="0" smtClean="0"/>
+              <a:t>3,3 KLOC (bez bibliotek zewnętrznych i kodu wygenerowanego automatycznie)</a:t>
+            </a:r>
+            <a:endParaRPr lang="pl-PL" dirty="0"/>
+          </a:p>
+        </p:txBody>
+      </p:sp>
+      <p:sp>
+        <p:nvSpPr>
+          <p:cNvPr id="3" name="Tytuł 2"/>
+          <p:cNvSpPr>
+            <a:spLocks noGrp="1"/>
+          </p:cNvSpPr>
+          <p:nvPr>
+            <p:ph type="title"/>
+          </p:nvPr>
+        </p:nvSpPr>
+        <p:spPr/>
+        <p:txBody>
+          <a:bodyPr/>
+          <a:lstStyle/>
+          <a:p>
+            <a:r>
+              <a:rPr lang="pl-PL" dirty="0" smtClean="0"/>
+              <a:t>Inne ciekawe dane</a:t>
+            </a:r>
+            <a:endParaRPr lang="pl-PL" dirty="0"/>
+          </a:p>
+        </p:txBody>
+      </p:sp>
+    </p:spTree>
+  </p:cSld>
+  <p:clrMapOvr>
+    <a:masterClrMapping/>
+  </p:clrMapOvr>
+</p:sld>
+</file>
+
 <file path=ppt/slides/slide5.xml><?xml version="1.0" encoding="utf-8"?>
 <p:sld xmlns:a="http://schemas.openxmlformats.org/drawingml/2006/main" xmlns:r="http://schemas.openxmlformats.org/officeDocument/2006/relationships" xmlns:p="http://schemas.openxmlformats.org/presentationml/2006/main">
   <p:cSld>
@@ -14389,29 +14507,13 @@
           <a:p>
             <a:r>
               <a:rPr lang="pl-PL" dirty="0" smtClean="0"/>
-              <a:t>Odpytywanie bazy o dostępność numeru</a:t>
-            </a:r>
-          </a:p>
-          <a:p>
-            <a:r>
-              <a:rPr lang="pl-PL" dirty="0" smtClean="0"/>
-              <a:t>Praca w dwóch trybach: </a:t>
-            </a:r>
-          </a:p>
-          <a:p>
-            <a:pPr lvl="1"/>
-            <a:r>
-              <a:rPr lang="pl-PL" dirty="0" smtClean="0"/>
-              <a:t>Odpytywanie bazy</a:t>
-            </a:r>
-          </a:p>
-          <a:p>
-            <a:pPr lvl="1"/>
-            <a:r>
-              <a:rPr lang="pl-PL" dirty="0" smtClean="0"/>
-              <a:t>Kopiowanie bazy do drzewa przedziałowego</a:t>
-            </a:r>
-            <a:endParaRPr lang="pl-PL" dirty="0"/>
+              <a:t>Odpytywanie bazy o dostępność </a:t>
+            </a:r>
+            <a:r>
+              <a:rPr lang="pl-PL" dirty="0" smtClean="0"/>
+              <a:t>numeru</a:t>
+            </a:r>
+            <a:endParaRPr lang="pl-PL" dirty="0" smtClean="0"/>
           </a:p>
         </p:txBody>
       </p:sp>
@@ -14580,18 +14682,46 @@
         </p:nvSpPr>
         <p:spPr>
           <a:xfrm>
-            <a:off x="457200" y="1481329"/>
-            <a:ext cx="8229600" cy="1018978"/>
+            <a:off x="457200" y="1481328"/>
+            <a:ext cx="8229600" cy="2304862"/>
           </a:xfrm>
         </p:spPr>
         <p:txBody>
-          <a:bodyPr/>
+          <a:bodyPr>
+            <a:normAutofit/>
+          </a:bodyPr>
           <a:lstStyle/>
           <a:p>
             <a:r>
               <a:rPr lang="pl-PL" dirty="0" smtClean="0"/>
-              <a:t>Przyjmuje zapytania o numer i przekazuje je do bazy</a:t>
-            </a:r>
+              <a:t>Przyjmuje zapytania o numer i przekazuje je do </a:t>
+            </a:r>
+            <a:r>
+              <a:rPr lang="pl-PL" dirty="0" smtClean="0"/>
+              <a:t>bazy</a:t>
+            </a:r>
+          </a:p>
+          <a:p>
+            <a:r>
+              <a:rPr lang="pl-PL" dirty="0" smtClean="0"/>
+              <a:t>Praca w dwóch trybach: </a:t>
+            </a:r>
+          </a:p>
+          <a:p>
+            <a:pPr lvl="1"/>
+            <a:r>
+              <a:rPr lang="pl-PL" dirty="0" smtClean="0"/>
+              <a:t>Odpytywanie bazy</a:t>
+            </a:r>
+          </a:p>
+          <a:p>
+            <a:pPr lvl="1"/>
+            <a:r>
+              <a:rPr lang="pl-PL" dirty="0" smtClean="0"/>
+              <a:t>Kopiowanie bazy do drzewa przedziałowego</a:t>
+            </a:r>
+          </a:p>
+          <a:p>
             <a:endParaRPr lang="pl-PL" dirty="0"/>
           </a:p>
         </p:txBody>
@@ -14629,7 +14759,7 @@
         </p:nvGraphicFramePr>
         <p:xfrm>
           <a:off x="571472" y="4000504"/>
-          <a:ext cx="8358246" cy="1854200"/>
+          <a:ext cx="8358246" cy="2397760"/>
         </p:xfrm>
         <a:graphic>
           <a:graphicData uri="http://schemas.openxmlformats.org/drawingml/2006/table">
@@ -14789,7 +14919,7 @@
                       </a:r>
                       <a:r>
                         <a:rPr lang="pl-PL" baseline="0" dirty="0" err="1" smtClean="0"/>
-                        <a:t>interval-tree</a:t>
+                        <a:t>interval-tree=X</a:t>
                       </a:r>
                       <a:endParaRPr lang="pl-PL" dirty="0"/>
                     </a:p>
@@ -14801,6 +14931,14 @@
                     <a:bodyPr/>
                     <a:lstStyle/>
                     <a:p>
+                      <a:r>
+                        <a:rPr lang="pl-PL" dirty="0" smtClean="0"/>
+                        <a:t>X &gt; 0 oznacza</a:t>
+                      </a:r>
+                      <a:r>
+                        <a:rPr lang="pl-PL" baseline="0" dirty="0" smtClean="0"/>
+                        <a:t> ilość sekund pomiędzy kopiowaniem bazy do drzewa; &lt;= 0 wyłącza drzewo</a:t>
+                      </a:r>
                       <a:endParaRPr lang="pl-PL" dirty="0"/>
                     </a:p>
                   </a:txBody>

</xml_diff>